<commit_message>
updated poster; new graphics
</commit_message>
<xml_diff>
--- a/monte carlo poster template neueste.pptx
+++ b/monte carlo poster template neueste.pptx
@@ -312,7 +312,7 @@
           <a:p>
             <a:fld id="{0B7A2DEA-69B7-D343-870B-04A176525892}" type="datetimeFigureOut">
               <a:rPr lang="de-DE" smtClean="0"/>
-              <a:t>03.02.2017</a:t>
+              <a:t>04.02.17</a:t>
             </a:fld>
             <a:endParaRPr lang="en-US"/>
           </a:p>
@@ -482,7 +482,7 @@
           <a:p>
             <a:fld id="{0B7A2DEA-69B7-D343-870B-04A176525892}" type="datetimeFigureOut">
               <a:rPr lang="de-DE" smtClean="0"/>
-              <a:t>03.02.2017</a:t>
+              <a:t>04.02.17</a:t>
             </a:fld>
             <a:endParaRPr lang="en-US"/>
           </a:p>
@@ -662,7 +662,7 @@
           <a:p>
             <a:fld id="{0B7A2DEA-69B7-D343-870B-04A176525892}" type="datetimeFigureOut">
               <a:rPr lang="de-DE" smtClean="0"/>
-              <a:t>03.02.2017</a:t>
+              <a:t>04.02.17</a:t>
             </a:fld>
             <a:endParaRPr lang="en-US"/>
           </a:p>
@@ -832,7 +832,7 @@
           <a:p>
             <a:fld id="{0B7A2DEA-69B7-D343-870B-04A176525892}" type="datetimeFigureOut">
               <a:rPr lang="de-DE" smtClean="0"/>
-              <a:t>03.02.2017</a:t>
+              <a:t>04.02.17</a:t>
             </a:fld>
             <a:endParaRPr lang="en-US"/>
           </a:p>
@@ -1078,7 +1078,7 @@
           <a:p>
             <a:fld id="{0B7A2DEA-69B7-D343-870B-04A176525892}" type="datetimeFigureOut">
               <a:rPr lang="de-DE" smtClean="0"/>
-              <a:t>03.02.2017</a:t>
+              <a:t>04.02.17</a:t>
             </a:fld>
             <a:endParaRPr lang="en-US"/>
           </a:p>
@@ -1366,7 +1366,7 @@
           <a:p>
             <a:fld id="{0B7A2DEA-69B7-D343-870B-04A176525892}" type="datetimeFigureOut">
               <a:rPr lang="de-DE" smtClean="0"/>
-              <a:t>03.02.2017</a:t>
+              <a:t>04.02.17</a:t>
             </a:fld>
             <a:endParaRPr lang="en-US"/>
           </a:p>
@@ -1793,7 +1793,7 @@
           <a:p>
             <a:fld id="{0B7A2DEA-69B7-D343-870B-04A176525892}" type="datetimeFigureOut">
               <a:rPr lang="de-DE" smtClean="0"/>
-              <a:t>03.02.2017</a:t>
+              <a:t>04.02.17</a:t>
             </a:fld>
             <a:endParaRPr lang="en-US"/>
           </a:p>
@@ -1911,7 +1911,7 @@
           <a:p>
             <a:fld id="{0B7A2DEA-69B7-D343-870B-04A176525892}" type="datetimeFigureOut">
               <a:rPr lang="de-DE" smtClean="0"/>
-              <a:t>03.02.2017</a:t>
+              <a:t>04.02.17</a:t>
             </a:fld>
             <a:endParaRPr lang="en-US"/>
           </a:p>
@@ -2006,7 +2006,7 @@
           <a:p>
             <a:fld id="{0B7A2DEA-69B7-D343-870B-04A176525892}" type="datetimeFigureOut">
               <a:rPr lang="de-DE" smtClean="0"/>
-              <a:t>03.02.2017</a:t>
+              <a:t>04.02.17</a:t>
             </a:fld>
             <a:endParaRPr lang="en-US"/>
           </a:p>
@@ -2283,7 +2283,7 @@
           <a:p>
             <a:fld id="{0B7A2DEA-69B7-D343-870B-04A176525892}" type="datetimeFigureOut">
               <a:rPr lang="de-DE" smtClean="0"/>
-              <a:t>03.02.2017</a:t>
+              <a:t>04.02.17</a:t>
             </a:fld>
             <a:endParaRPr lang="en-US"/>
           </a:p>
@@ -2536,7 +2536,7 @@
           <a:p>
             <a:fld id="{0B7A2DEA-69B7-D343-870B-04A176525892}" type="datetimeFigureOut">
               <a:rPr lang="de-DE" smtClean="0"/>
-              <a:t>03.02.2017</a:t>
+              <a:t>04.02.17</a:t>
             </a:fld>
             <a:endParaRPr lang="en-US"/>
           </a:p>
@@ -2749,7 +2749,7 @@
           <a:p>
             <a:fld id="{0B7A2DEA-69B7-D343-870B-04A176525892}" type="datetimeFigureOut">
               <a:rPr lang="de-DE" smtClean="0"/>
-              <a:t>03.02.2017</a:t>
+              <a:t>04.02.17</a:t>
             </a:fld>
             <a:endParaRPr lang="en-US"/>
           </a:p>
@@ -3264,28 +3264,28 @@
           </a:lstStyle>
           <a:p>
             <a:r>
-              <a:rPr lang="de-DE" sz="8800" b="1" dirty="0" err="1">
+              <a:rPr lang="de-DE" sz="8800" b="1" dirty="0" err="1" smtClean="0">
                 <a:solidFill>
                   <a:schemeClr val="bg1"/>
                 </a:solidFill>
               </a:rPr>
-              <a:t>Some</a:t>
-            </a:r>
-            <a:r>
-              <a:rPr lang="de-DE" sz="8800" b="1" dirty="0">
+              <a:t>Kologorov-Smirnoff</a:t>
+            </a:r>
+            <a:r>
+              <a:rPr lang="de-DE" sz="8800" b="1" dirty="0" smtClean="0">
                 <a:solidFill>
                   <a:schemeClr val="bg1"/>
                 </a:solidFill>
               </a:rPr>
-              <a:t> Monte Carlo </a:t>
-            </a:r>
-            <a:r>
-              <a:rPr lang="de-DE" sz="8800" b="1" dirty="0" err="1">
+              <a:t> </a:t>
+            </a:r>
+            <a:r>
+              <a:rPr lang="de-DE" sz="8800" b="1" smtClean="0">
                 <a:solidFill>
                   <a:schemeClr val="bg1"/>
                 </a:solidFill>
               </a:rPr>
-              <a:t>topic</a:t>
+              <a:t>Permutation Test</a:t>
             </a:r>
             <a:endParaRPr lang="en-GB" sz="8500" b="1" dirty="0">
               <a:solidFill>
@@ -3380,7 +3380,7 @@
               </a:spcBef>
             </a:pPr>
             <a:r>
-              <a:rPr lang="en-US" sz="5500" b="1">
+              <a:rPr lang="en-US" sz="5500" b="1" dirty="0">
                 <a:solidFill>
                   <a:srgbClr val="FFFFFF"/>
                 </a:solidFill>
@@ -3389,13 +3389,6 @@
               </a:rPr>
               <a:t>Humboldt University Berlin, Berlin, Germany</a:t>
             </a:r>
-            <a:endParaRPr lang="en-US" sz="5500" b="1" dirty="0">
-              <a:solidFill>
-                <a:srgbClr val="FFFFFF"/>
-              </a:solidFill>
-              <a:latin typeface="Arial" panose="020B0604020202020204" pitchFamily="34" charset="0"/>
-              <a:cs typeface="Arial" panose="020B0604020202020204" pitchFamily="34" charset="0"/>
-            </a:endParaRPr>
           </a:p>
         </p:txBody>
       </p:sp>
@@ -4175,7 +4168,7 @@
                       <m:sSubPr>
                         <m:ctrlPr>
                           <a:rPr lang="en-US" sz="3000" i="1" dirty="0" smtClean="0">
-                            <a:latin typeface="Cambria Math" panose="02040503050406030204" pitchFamily="18" charset="0"/>
+                            <a:latin typeface="Cambria Math" charset="0"/>
                             <a:ea typeface="Times New Roman" charset="0"/>
                             <a:cs typeface="Times New Roman" charset="0"/>
                           </a:rPr>
@@ -4232,7 +4225,7 @@
                       <m:sSubPr>
                         <m:ctrlPr>
                           <a:rPr lang="en-US" sz="3000" i="1" dirty="0" smtClean="0">
-                            <a:latin typeface="Cambria Math" panose="02040503050406030204" pitchFamily="18" charset="0"/>
+                            <a:latin typeface="Cambria Math" charset="0"/>
                             <a:ea typeface="Times New Roman" charset="0"/>
                             <a:cs typeface="Times New Roman" charset="0"/>
                           </a:rPr>
@@ -5307,7 +5300,7 @@
         </p:nvCxnSpPr>
         <p:spPr>
           <a:xfrm flipV="1">
-            <a:off x="277115" y="24673171"/>
+            <a:off x="227926" y="24921511"/>
             <a:ext cx="29217766" cy="68917"/>
           </a:xfrm>
           <a:prstGeom prst="line">
@@ -7239,7 +7232,7 @@
                       <m:sSubPr>
                         <m:ctrlPr>
                           <a:rPr lang="sv-SE" sz="2800" i="1" dirty="0" smtClean="0">
-                            <a:latin typeface="Cambria Math" panose="02040503050406030204" pitchFamily="18" charset="0"/>
+                            <a:latin typeface="Cambria Math" charset="0"/>
                             <a:ea typeface="Times New Roman" charset="0"/>
                             <a:cs typeface="Times New Roman" charset="0"/>
                           </a:rPr>
@@ -7416,7 +7409,7 @@
                       <m:sSubPr>
                         <m:ctrlPr>
                           <a:rPr lang="sv-SE" sz="2800" i="1" dirty="0" smtClean="0">
-                            <a:latin typeface="Cambria Math" panose="02040503050406030204" pitchFamily="18" charset="0"/>
+                            <a:latin typeface="Cambria Math" charset="0"/>
                             <a:ea typeface="Times New Roman" charset="0"/>
                             <a:cs typeface="Times New Roman" charset="0"/>
                           </a:rPr>
@@ -7557,7 +7550,7 @@
                       <m:sSubPr>
                         <m:ctrlPr>
                           <a:rPr lang="sv-SE" sz="2800" i="1" dirty="0" smtClean="0">
-                            <a:latin typeface="Cambria Math" panose="02040503050406030204" pitchFamily="18" charset="0"/>
+                            <a:latin typeface="Cambria Math" charset="0"/>
                             <a:ea typeface="Times New Roman" charset="0"/>
                             <a:cs typeface="Times New Roman" charset="0"/>
                           </a:rPr>
@@ -7822,7 +7815,7 @@
                       <m:fPr>
                         <m:ctrlPr>
                           <a:rPr lang="de-DE" sz="2800" b="0" i="1" smtClean="0">
-                            <a:latin typeface="Cambria Math" panose="02040503050406030204" pitchFamily="18" charset="0"/>
+                            <a:latin typeface="Cambria Math" charset="0"/>
                             <a:cs typeface="Times New Roman" charset="0"/>
                           </a:rPr>
                         </m:ctrlPr>
@@ -7968,66 +7961,6 @@
           </p:sp>
         </mc:Fallback>
       </mc:AlternateContent>
-      <p:pic>
-        <p:nvPicPr>
-          <p:cNvPr id="3" name="Bild 2"/>
-          <p:cNvPicPr>
-            <a:picLocks noChangeAspect="1"/>
-          </p:cNvPicPr>
-          <p:nvPr/>
-        </p:nvPicPr>
-        <p:blipFill>
-          <a:blip r:embed="rId5">
-            <a:extLst>
-              <a:ext uri="{28A0092B-C50C-407E-A947-70E740481C1C}">
-                <a14:useLocalDpi xmlns:a14="http://schemas.microsoft.com/office/drawing/2010/main" val="0"/>
-              </a:ext>
-            </a:extLst>
-          </a:blip>
-          <a:stretch>
-            <a:fillRect/>
-          </a:stretch>
-        </p:blipFill>
-        <p:spPr>
-          <a:xfrm>
-            <a:off x="722877" y="18276611"/>
-            <a:ext cx="6914317" cy="5736131"/>
-          </a:xfrm>
-          <a:prstGeom prst="rect">
-            <a:avLst/>
-          </a:prstGeom>
-        </p:spPr>
-      </p:pic>
-      <p:pic>
-        <p:nvPicPr>
-          <p:cNvPr id="4" name="Bild 3"/>
-          <p:cNvPicPr>
-            <a:picLocks noChangeAspect="1"/>
-          </p:cNvPicPr>
-          <p:nvPr/>
-        </p:nvPicPr>
-        <p:blipFill>
-          <a:blip r:embed="rId6">
-            <a:extLst>
-              <a:ext uri="{28A0092B-C50C-407E-A947-70E740481C1C}">
-                <a14:useLocalDpi xmlns:a14="http://schemas.microsoft.com/office/drawing/2010/main" val="0"/>
-              </a:ext>
-            </a:extLst>
-          </a:blip>
-          <a:stretch>
-            <a:fillRect/>
-          </a:stretch>
-        </p:blipFill>
-        <p:spPr>
-          <a:xfrm>
-            <a:off x="7872104" y="18222900"/>
-            <a:ext cx="6850053" cy="5778393"/>
-          </a:xfrm>
-          <a:prstGeom prst="rect">
-            <a:avLst/>
-          </a:prstGeom>
-        </p:spPr>
-      </p:pic>
       <p:sp>
         <p:nvSpPr>
           <p:cNvPr id="11" name="Textfeld 10"/>
@@ -8036,7 +7969,7 @@
         </p:nvSpPr>
         <p:spPr>
           <a:xfrm>
-            <a:off x="592577" y="23955332"/>
+            <a:off x="368025" y="24225635"/>
             <a:ext cx="6065913" cy="400110"/>
           </a:xfrm>
           <a:prstGeom prst="rect">
@@ -8090,7 +8023,101 @@
         </p:nvSpPr>
         <p:spPr>
           <a:xfrm>
-            <a:off x="7872104" y="23995363"/>
+            <a:off x="9592064" y="23249129"/>
+            <a:ext cx="5222460" cy="707886"/>
+          </a:xfrm>
+          <a:prstGeom prst="rect">
+            <a:avLst/>
+          </a:prstGeom>
+          <a:noFill/>
+        </p:spPr>
+        <p:txBody>
+          <a:bodyPr wrap="square" rtlCol="0">
+            <a:spAutoFit/>
+          </a:bodyPr>
+          <a:lstStyle/>
+          <a:p>
+            <a:r>
+              <a:rPr lang="de-DE" sz="2000" dirty="0" err="1"/>
+              <a:t>Figure</a:t>
+            </a:r>
+            <a:r>
+              <a:rPr lang="de-DE" sz="2000" dirty="0"/>
+              <a:t> 2. </a:t>
+            </a:r>
+            <a:r>
+              <a:rPr lang="de-DE" sz="2000" dirty="0" err="1"/>
+              <a:t>Histogram</a:t>
+            </a:r>
+            <a:r>
+              <a:rPr lang="de-DE" sz="2000" dirty="0"/>
+              <a:t> </a:t>
+            </a:r>
+            <a:r>
+              <a:rPr lang="de-DE" sz="2000" dirty="0" err="1"/>
+              <a:t>of</a:t>
+            </a:r>
+            <a:r>
+              <a:rPr lang="de-DE" sz="2000" dirty="0"/>
+              <a:t> </a:t>
+            </a:r>
+            <a:r>
+              <a:rPr lang="de-DE" sz="2000" dirty="0" err="1"/>
+              <a:t>simulated</a:t>
+            </a:r>
+            <a:r>
+              <a:rPr lang="de-DE" sz="2000" dirty="0"/>
+              <a:t> KS </a:t>
+            </a:r>
+            <a:r>
+              <a:rPr lang="de-DE" sz="2000" dirty="0" err="1"/>
+              <a:t>test</a:t>
+            </a:r>
+            <a:r>
+              <a:rPr lang="de-DE" sz="2000" dirty="0"/>
+              <a:t> </a:t>
+            </a:r>
+            <a:r>
+              <a:rPr lang="de-DE" sz="2000" dirty="0" err="1"/>
+              <a:t>statistics</a:t>
+            </a:r>
+            <a:r>
+              <a:rPr lang="de-DE" sz="2000" dirty="0"/>
+              <a:t> </a:t>
+            </a:r>
+            <a:r>
+              <a:rPr lang="de-DE" sz="2000" dirty="0" err="1"/>
+              <a:t>and</a:t>
+            </a:r>
+            <a:r>
+              <a:rPr lang="de-DE" sz="2000" dirty="0"/>
+              <a:t> </a:t>
+            </a:r>
+            <a:r>
+              <a:rPr lang="de-DE" sz="2000" dirty="0" err="1"/>
+              <a:t>empirical</a:t>
+            </a:r>
+            <a:r>
+              <a:rPr lang="de-DE" sz="2000" dirty="0"/>
+              <a:t> 95% </a:t>
+            </a:r>
+            <a:r>
+              <a:rPr lang="de-DE" sz="2000" dirty="0" err="1"/>
+              <a:t>quantile</a:t>
+            </a:r>
+            <a:endParaRPr lang="de-DE" sz="2000" dirty="0"/>
+          </a:p>
+        </p:txBody>
+      </p:sp>
+      <p:sp>
+        <p:nvSpPr>
+          <p:cNvPr id="40" name="Textfeld 39"/>
+          <p:cNvSpPr txBox="1"/>
+          <p:nvPr/>
+        </p:nvSpPr>
+        <p:spPr>
+          <a:xfrm>
+            <a:off x="14906123" y="23244623"/>
             <a:ext cx="6065913" cy="707886"/>
           </a:xfrm>
           <a:prstGeom prst="rect">
@@ -8110,67 +8137,75 @@
             </a:r>
             <a:r>
               <a:rPr lang="de-DE" sz="2000" dirty="0"/>
-              <a:t> 2. </a:t>
-            </a:r>
-            <a:r>
-              <a:rPr lang="de-DE" sz="2000" dirty="0" err="1"/>
-              <a:t>Histogram</a:t>
-            </a:r>
-            <a:r>
-              <a:rPr lang="de-DE" sz="2000" dirty="0"/>
+              <a:t> 3. </a:t>
+            </a:r>
+            <a:r>
+              <a:rPr lang="de-DE" sz="2000" dirty="0" err="1" smtClean="0"/>
+              <a:t>Variance</a:t>
+            </a:r>
+            <a:r>
+              <a:rPr lang="de-DE" sz="2000" dirty="0" smtClean="0"/>
               <a:t> </a:t>
             </a:r>
             <a:r>
-              <a:rPr lang="de-DE" sz="2000" dirty="0" err="1"/>
+              <a:rPr lang="de-DE" sz="2000" dirty="0" err="1" smtClean="0"/>
               <a:t>of</a:t>
             </a:r>
             <a:r>
-              <a:rPr lang="de-DE" sz="2000" dirty="0"/>
+              <a:rPr lang="de-DE" sz="2000" dirty="0" smtClean="0"/>
               <a:t> </a:t>
             </a:r>
             <a:r>
-              <a:rPr lang="de-DE" sz="2000" dirty="0" err="1"/>
-              <a:t>simulated</a:t>
-            </a:r>
-            <a:r>
-              <a:rPr lang="de-DE" sz="2000" dirty="0"/>
-              <a:t> KS </a:t>
-            </a:r>
-            <a:r>
-              <a:rPr lang="de-DE" sz="2000" dirty="0" err="1"/>
-              <a:t>test</a:t>
-            </a:r>
-            <a:r>
-              <a:rPr lang="de-DE" sz="2000" dirty="0"/>
+              <a:rPr lang="de-DE" sz="2000" dirty="0" err="1" smtClean="0"/>
+              <a:t>the</a:t>
+            </a:r>
+            <a:r>
+              <a:rPr lang="de-DE" sz="2000" dirty="0" smtClean="0"/>
               <a:t> </a:t>
             </a:r>
             <a:r>
-              <a:rPr lang="de-DE" sz="2000" dirty="0" err="1"/>
-              <a:t>statistics</a:t>
-            </a:r>
-            <a:r>
-              <a:rPr lang="de-DE" sz="2000" dirty="0"/>
+              <a:rPr lang="de-DE" sz="2000" dirty="0" err="1" smtClean="0"/>
+              <a:t>empirical</a:t>
+            </a:r>
+            <a:r>
+              <a:rPr lang="de-DE" sz="2000" dirty="0" smtClean="0"/>
+              <a:t> p-</a:t>
+            </a:r>
+            <a:r>
+              <a:rPr lang="de-DE" sz="2000" dirty="0" err="1" smtClean="0"/>
+              <a:t>values</a:t>
+            </a:r>
+            <a:r>
+              <a:rPr lang="de-DE" sz="2000" dirty="0" smtClean="0"/>
               <a:t> </a:t>
             </a:r>
             <a:r>
-              <a:rPr lang="de-DE" sz="2000" dirty="0" err="1"/>
-              <a:t>and</a:t>
-            </a:r>
-            <a:r>
-              <a:rPr lang="de-DE" sz="2000" dirty="0"/>
+              <a:rPr lang="de-DE" sz="2000" dirty="0" err="1" smtClean="0"/>
+              <a:t>under</a:t>
+            </a:r>
+            <a:r>
+              <a:rPr lang="de-DE" sz="2000" dirty="0" smtClean="0"/>
+              <a:t> different </a:t>
+            </a:r>
+            <a:r>
+              <a:rPr lang="de-DE" sz="2000" dirty="0" err="1" smtClean="0"/>
+              <a:t>number</a:t>
+            </a:r>
+            <a:r>
+              <a:rPr lang="de-DE" sz="2000" dirty="0" smtClean="0"/>
               <a:t> </a:t>
             </a:r>
             <a:r>
-              <a:rPr lang="de-DE" sz="2000" dirty="0" err="1"/>
-              <a:t>empirical</a:t>
-            </a:r>
-            <a:r>
-              <a:rPr lang="de-DE" sz="2000" dirty="0"/>
-              <a:t> 95% </a:t>
-            </a:r>
-            <a:r>
-              <a:rPr lang="de-DE" sz="2000" dirty="0" err="1"/>
-              <a:t>quantile</a:t>
+              <a:rPr lang="de-DE" sz="2000" dirty="0" err="1" smtClean="0"/>
+              <a:t>of</a:t>
+            </a:r>
+            <a:r>
+              <a:rPr lang="de-DE" sz="2000" dirty="0" smtClean="0"/>
+              <a:t> </a:t>
+            </a:r>
+            <a:r>
+              <a:rPr lang="de-DE" sz="2000" dirty="0" err="1" smtClean="0"/>
+              <a:t>permutations</a:t>
             </a:r>
             <a:endParaRPr lang="de-DE" sz="2000" dirty="0"/>
           </a:p>
@@ -8178,13 +8213,13 @@
       </p:sp>
       <p:sp>
         <p:nvSpPr>
-          <p:cNvPr id="40" name="Textfeld 39"/>
+          <p:cNvPr id="41" name="Textfeld 40"/>
           <p:cNvSpPr txBox="1"/>
           <p:nvPr/>
         </p:nvSpPr>
         <p:spPr>
           <a:xfrm>
-            <a:off x="15032790" y="23928619"/>
+            <a:off x="20540962" y="24071747"/>
             <a:ext cx="6065913" cy="707886"/>
           </a:xfrm>
           <a:prstGeom prst="rect">
@@ -8204,11 +8239,15 @@
             </a:r>
             <a:r>
               <a:rPr lang="de-DE" sz="2000" dirty="0"/>
-              <a:t> 3. </a:t>
+              <a:t> 4. </a:t>
+            </a:r>
+            <a:r>
+              <a:rPr lang="de-DE" sz="2000" dirty="0"/>
+              <a:t>. </a:t>
             </a:r>
             <a:r>
               <a:rPr lang="de-DE" sz="2000" dirty="0" err="1"/>
-              <a:t>Density</a:t>
+              <a:t>Variance</a:t>
             </a:r>
             <a:r>
               <a:rPr lang="de-DE" sz="2000" dirty="0"/>
@@ -8216,7 +8255,7 @@
             </a:r>
             <a:r>
               <a:rPr lang="de-DE" sz="2000" dirty="0" err="1"/>
-              <a:t>estimation</a:t>
+              <a:t>of</a:t>
             </a:r>
             <a:r>
               <a:rPr lang="de-DE" sz="2000" dirty="0"/>
@@ -8224,7 +8263,7 @@
             </a:r>
             <a:r>
               <a:rPr lang="de-DE" sz="2000" dirty="0" err="1"/>
-              <a:t>for</a:t>
+              <a:t>the</a:t>
             </a:r>
             <a:r>
               <a:rPr lang="de-DE" sz="2000" dirty="0"/>
@@ -8232,7 +8271,15 @@
             </a:r>
             <a:r>
               <a:rPr lang="de-DE" sz="2000" dirty="0" err="1"/>
-              <a:t>the</a:t>
+              <a:t>empirical</a:t>
+            </a:r>
+            <a:r>
+              <a:rPr lang="de-DE" sz="2000" dirty="0"/>
+              <a:t> p-</a:t>
+            </a:r>
+            <a:r>
+              <a:rPr lang="de-DE" sz="2000" dirty="0" err="1"/>
+              <a:t>values</a:t>
             </a:r>
             <a:r>
               <a:rPr lang="de-DE" sz="2000" dirty="0"/>
@@ -8240,157 +8287,19 @@
             </a:r>
             <a:r>
               <a:rPr lang="de-DE" sz="2000" dirty="0" err="1"/>
-              <a:t>empirical</a:t>
-            </a:r>
-            <a:r>
-              <a:rPr lang="de-DE" sz="2000" dirty="0"/>
-              <a:t> p-</a:t>
-            </a:r>
-            <a:r>
-              <a:rPr lang="de-DE" sz="2000" dirty="0" err="1"/>
-              <a:t>values</a:t>
-            </a:r>
-            <a:r>
-              <a:rPr lang="de-DE" sz="2000" dirty="0"/>
-              <a:t> </a:t>
-            </a:r>
-            <a:r>
-              <a:rPr lang="de-DE" sz="2000" dirty="0" err="1"/>
-              <a:t>for</a:t>
-            </a:r>
-            <a:r>
-              <a:rPr lang="de-DE" sz="2000" dirty="0"/>
-              <a:t> </a:t>
-            </a:r>
-            <a:r>
-              <a:rPr lang="de-DE" sz="2000" dirty="0" err="1"/>
-              <a:t>four</a:t>
+              <a:t>under</a:t>
             </a:r>
             <a:r>
               <a:rPr lang="de-DE" sz="2000" dirty="0"/>
               <a:t> different </a:t>
             </a:r>
             <a:r>
-              <a:rPr lang="de-DE" sz="2000" dirty="0" err="1"/>
-              <a:t>number</a:t>
-            </a:r>
-            <a:r>
-              <a:rPr lang="de-DE" sz="2000" dirty="0"/>
-              <a:t> </a:t>
-            </a:r>
-            <a:r>
-              <a:rPr lang="de-DE" sz="2000" dirty="0" err="1"/>
-              <a:t>of</a:t>
-            </a:r>
-            <a:r>
-              <a:rPr lang="de-DE" sz="2000" dirty="0"/>
-              <a:t> </a:t>
-            </a:r>
-            <a:r>
-              <a:rPr lang="de-DE" sz="2000" dirty="0" err="1"/>
-              <a:t>permutations</a:t>
-            </a:r>
-            <a:endParaRPr lang="de-DE" sz="2000" dirty="0"/>
-          </a:p>
-        </p:txBody>
-      </p:sp>
-      <p:sp>
-        <p:nvSpPr>
-          <p:cNvPr id="41" name="Textfeld 40"/>
-          <p:cNvSpPr txBox="1"/>
-          <p:nvPr/>
-        </p:nvSpPr>
-        <p:spPr>
-          <a:xfrm>
-            <a:off x="22302125" y="23931713"/>
-            <a:ext cx="6065913" cy="707886"/>
-          </a:xfrm>
-          <a:prstGeom prst="rect">
-            <a:avLst/>
-          </a:prstGeom>
-          <a:noFill/>
-        </p:spPr>
-        <p:txBody>
-          <a:bodyPr wrap="square" rtlCol="0">
-            <a:spAutoFit/>
-          </a:bodyPr>
-          <a:lstStyle/>
-          <a:p>
-            <a:r>
-              <a:rPr lang="de-DE" sz="2000" dirty="0" err="1"/>
-              <a:t>Figure</a:t>
-            </a:r>
-            <a:r>
-              <a:rPr lang="de-DE" sz="2000" dirty="0"/>
-              <a:t> 4. </a:t>
-            </a:r>
-            <a:r>
-              <a:rPr lang="de-DE" sz="2000" dirty="0" err="1"/>
-              <a:t>Mean</a:t>
-            </a:r>
-            <a:r>
-              <a:rPr lang="de-DE" sz="2000" dirty="0"/>
-              <a:t> </a:t>
-            </a:r>
-            <a:r>
-              <a:rPr lang="de-DE" sz="2000" dirty="0" err="1"/>
-              <a:t>and</a:t>
-            </a:r>
-            <a:r>
-              <a:rPr lang="de-DE" sz="2000" dirty="0"/>
-              <a:t> 95%-CI </a:t>
-            </a:r>
-            <a:r>
-              <a:rPr lang="de-DE" sz="2000" dirty="0" err="1"/>
-              <a:t>of</a:t>
-            </a:r>
-            <a:r>
-              <a:rPr lang="de-DE" sz="2000" dirty="0"/>
-              <a:t> </a:t>
-            </a:r>
-            <a:r>
-              <a:rPr lang="de-DE" sz="2000" dirty="0" err="1"/>
-              <a:t>empirical</a:t>
-            </a:r>
-            <a:r>
-              <a:rPr lang="de-DE" sz="2000" dirty="0"/>
-              <a:t> p-</a:t>
-            </a:r>
-            <a:r>
-              <a:rPr lang="de-DE" sz="2000" dirty="0" err="1"/>
-              <a:t>values</a:t>
-            </a:r>
-            <a:r>
-              <a:rPr lang="de-DE" sz="2000" dirty="0"/>
-              <a:t> </a:t>
-            </a:r>
-            <a:r>
-              <a:rPr lang="de-DE" sz="2000" dirty="0" err="1"/>
-              <a:t>for</a:t>
-            </a:r>
-            <a:r>
-              <a:rPr lang="de-DE" sz="2000" dirty="0"/>
-              <a:t> different </a:t>
-            </a:r>
-            <a:r>
-              <a:rPr lang="de-DE" sz="2000" dirty="0" err="1"/>
-              <a:t>numbers</a:t>
-            </a:r>
-            <a:r>
-              <a:rPr lang="de-DE" sz="2000" dirty="0"/>
-              <a:t> </a:t>
-            </a:r>
-            <a:r>
-              <a:rPr lang="de-DE" sz="2000" dirty="0" err="1"/>
-              <a:t>of</a:t>
-            </a:r>
-            <a:r>
-              <a:rPr lang="de-DE" sz="2000" dirty="0"/>
-              <a:t> </a:t>
-            </a:r>
-            <a:r>
-              <a:rPr lang="de-DE" sz="2000" dirty="0" err="1"/>
-              <a:t>permutations</a:t>
+              <a:rPr lang="de-DE" sz="2000" dirty="0" smtClean="0"/>
+              <a:t>sample </a:t>
+            </a:r>
+            <a:r>
+              <a:rPr lang="de-DE" sz="2000" dirty="0" err="1" smtClean="0"/>
+              <a:t>sizes</a:t>
             </a:r>
             <a:endParaRPr lang="de-DE" sz="2000" dirty="0"/>
           </a:p>
@@ -8403,9 +8312,9 @@
           <p:nvPr/>
         </p:nvCxnSpPr>
         <p:spPr>
-          <a:xfrm>
-            <a:off x="14611821" y="24742088"/>
-            <a:ext cx="33165" cy="9298130"/>
+          <a:xfrm flipH="1">
+            <a:off x="14644986" y="26494392"/>
+            <a:ext cx="54262" cy="7545826"/>
           </a:xfrm>
           <a:prstGeom prst="line">
             <a:avLst/>
@@ -8437,7 +8346,7 @@
           <p:nvPr/>
         </p:nvPicPr>
         <p:blipFill>
-          <a:blip r:embed="rId7">
+          <a:blip r:embed="rId5">
             <a:extLst>
               <a:ext uri="{28A0092B-C50C-407E-A947-70E740481C1C}">
                 <a14:useLocalDpi xmlns:a14="http://schemas.microsoft.com/office/drawing/2010/main" val="0"/>
@@ -8467,7 +8376,7 @@
           <p:nvPr/>
         </p:nvPicPr>
         <p:blipFill>
-          <a:blip r:embed="rId8">
+          <a:blip r:embed="rId6">
             <a:extLst>
               <a:ext uri="{28A0092B-C50C-407E-A947-70E740481C1C}">
                 <a14:useLocalDpi xmlns:a14="http://schemas.microsoft.com/office/drawing/2010/main" val="0"/>
@@ -8488,38 +8397,8 @@
           </a:prstGeom>
         </p:spPr>
       </p:pic>
-      <p:pic>
-        <p:nvPicPr>
-          <p:cNvPr id="12" name="Bild 11"/>
-          <p:cNvPicPr>
-            <a:picLocks noChangeAspect="1"/>
-          </p:cNvPicPr>
-          <p:nvPr/>
-        </p:nvPicPr>
-        <p:blipFill>
-          <a:blip r:embed="rId9">
-            <a:extLst>
-              <a:ext uri="{28A0092B-C50C-407E-A947-70E740481C1C}">
-                <a14:useLocalDpi xmlns:a14="http://schemas.microsoft.com/office/drawing/2010/main" val="0"/>
-              </a:ext>
-            </a:extLst>
-          </a:blip>
-          <a:stretch>
-            <a:fillRect/>
-          </a:stretch>
-        </p:blipFill>
-        <p:spPr>
-          <a:xfrm>
-            <a:off x="22302125" y="18143477"/>
-            <a:ext cx="5667386" cy="5667386"/>
-          </a:xfrm>
-          <a:prstGeom prst="rect">
-            <a:avLst/>
-          </a:prstGeom>
-        </p:spPr>
-      </p:pic>
-      <mc:AlternateContent xmlns:mc="http://schemas.openxmlformats.org/markup-compatibility/2006" xmlns:a14="http://schemas.microsoft.com/office/drawing/2010/main">
-        <mc:Choice Requires="a14">
+      <mc:AlternateContent xmlns:mc="http://schemas.openxmlformats.org/markup-compatibility/2006">
+        <mc:Choice xmlns:a14="http://schemas.microsoft.com/office/drawing/2010/main" Requires="a14">
           <p:sp>
             <p:nvSpPr>
               <p:cNvPr id="43" name="Textfeld 42"/>
@@ -8528,7 +8407,7 @@
             </p:nvSpPr>
             <p:spPr>
               <a:xfrm>
-                <a:off x="314489" y="24755503"/>
+                <a:off x="265424" y="25334101"/>
                 <a:ext cx="14222839" cy="9352903"/>
               </a:xfrm>
               <a:prstGeom prst="rect">
@@ -8863,7 +8742,7 @@
                       <m:sSubPr>
                         <m:ctrlPr>
                           <a:rPr lang="de-DE" sz="2800" i="1" dirty="0" smtClean="0">
-                            <a:latin typeface="Cambria Math" panose="02040503050406030204" pitchFamily="18" charset="0"/>
+                            <a:latin typeface="Cambria Math" charset="0"/>
                             <a:ea typeface="Times New Roman" charset="0"/>
                             <a:cs typeface="Times New Roman" charset="0"/>
                           </a:rPr>
@@ -9216,7 +9095,7 @@
                       <m:sSubPr>
                         <m:ctrlPr>
                           <a:rPr lang="de-DE" sz="2800" i="1" dirty="0" smtClean="0">
-                            <a:latin typeface="Cambria Math" panose="02040503050406030204" pitchFamily="18" charset="0"/>
+                            <a:latin typeface="Cambria Math" charset="0"/>
                             <a:ea typeface="Times New Roman" charset="0"/>
                             <a:cs typeface="Times New Roman" charset="0"/>
                           </a:rPr>
@@ -9547,7 +9426,7 @@
                       <m:sSubPr>
                         <m:ctrlPr>
                           <a:rPr lang="de-DE" sz="2800" i="1" dirty="0" smtClean="0">
-                            <a:latin typeface="Cambria Math" panose="02040503050406030204" pitchFamily="18" charset="0"/>
+                            <a:latin typeface="Cambria Math" charset="0"/>
                             <a:ea typeface="Times New Roman" charset="0"/>
                             <a:cs typeface="Times New Roman" charset="0"/>
                           </a:rPr>
@@ -9890,7 +9769,7 @@
                       <m:sSubPr>
                         <m:ctrlPr>
                           <a:rPr lang="en-US" sz="2800" i="1" dirty="0" smtClean="0">
-                            <a:latin typeface="Cambria Math" panose="02040503050406030204" pitchFamily="18" charset="0"/>
+                            <a:latin typeface="Cambria Math" charset="0"/>
                             <a:ea typeface="Times New Roman" charset="0"/>
                             <a:cs typeface="Times New Roman" charset="0"/>
                           </a:rPr>
@@ -9999,7 +9878,7 @@
                       <m:sSubPr>
                         <m:ctrlPr>
                           <a:rPr lang="en-US" sz="2800" i="1" dirty="0" smtClean="0">
-                            <a:latin typeface="Cambria Math" panose="02040503050406030204" pitchFamily="18" charset="0"/>
+                            <a:latin typeface="Cambria Math" charset="0"/>
                             <a:ea typeface="Times New Roman" charset="0"/>
                             <a:cs typeface="Times New Roman" charset="0"/>
                           </a:rPr>
@@ -10096,7 +9975,7 @@
                       <m:sSubPr>
                         <m:ctrlPr>
                           <a:rPr lang="en-US" sz="2800" i="1" dirty="0" smtClean="0">
-                            <a:latin typeface="Cambria Math" panose="02040503050406030204" pitchFamily="18" charset="0"/>
+                            <a:latin typeface="Cambria Math" charset="0"/>
                             <a:ea typeface="Times New Roman" charset="0"/>
                             <a:cs typeface="Times New Roman" charset="0"/>
                           </a:rPr>
@@ -10189,7 +10068,7 @@
             </p:txBody>
           </p:sp>
         </mc:Choice>
-        <mc:Fallback xmlns="">
+        <mc:Fallback>
           <p:sp>
             <p:nvSpPr>
               <p:cNvPr id="43" name="Textfeld 42"/>
@@ -10200,16 +10079,16 @@
             </p:nvSpPr>
             <p:spPr>
               <a:xfrm>
-                <a:off x="314489" y="24755503"/>
+                <a:off x="265424" y="25334101"/>
                 <a:ext cx="14222839" cy="9352903"/>
               </a:xfrm>
               <a:prstGeom prst="rect">
                 <a:avLst/>
               </a:prstGeom>
-              <a:blipFill>
-                <a:blip r:embed="rId10"/>
+              <a:blipFill rotWithShape="0">
+                <a:blip r:embed="rId7"/>
                 <a:stretch>
-                  <a:fillRect t="-717" r="-2143"/>
+                  <a:fillRect t="-717" r="-857"/>
                 </a:stretch>
               </a:blipFill>
               <a:effectLst/>
@@ -10229,6 +10108,246 @@
           </p:sp>
         </mc:Fallback>
       </mc:AlternateContent>
+      <p:pic>
+        <p:nvPicPr>
+          <p:cNvPr id="2" name="Bild 1"/>
+          <p:cNvPicPr>
+            <a:picLocks noChangeAspect="1"/>
+          </p:cNvPicPr>
+          <p:nvPr/>
+        </p:nvPicPr>
+        <p:blipFill>
+          <a:blip r:embed="rId8">
+            <a:extLst>
+              <a:ext uri="{28A0092B-C50C-407E-A947-70E740481C1C}">
+                <a14:useLocalDpi xmlns:a14="http://schemas.microsoft.com/office/drawing/2010/main" val="0"/>
+              </a:ext>
+            </a:extLst>
+          </a:blip>
+          <a:stretch>
+            <a:fillRect/>
+          </a:stretch>
+        </p:blipFill>
+        <p:spPr>
+          <a:xfrm>
+            <a:off x="314489" y="17955216"/>
+            <a:ext cx="9091455" cy="6095407"/>
+          </a:xfrm>
+          <a:prstGeom prst="rect">
+            <a:avLst/>
+          </a:prstGeom>
+        </p:spPr>
+      </p:pic>
+      <p:pic>
+        <p:nvPicPr>
+          <p:cNvPr id="3" name="Bild 2"/>
+          <p:cNvPicPr>
+            <a:picLocks noChangeAspect="1"/>
+          </p:cNvPicPr>
+          <p:nvPr/>
+        </p:nvPicPr>
+        <p:blipFill>
+          <a:blip r:embed="rId9">
+            <a:extLst>
+              <a:ext uri="{28A0092B-C50C-407E-A947-70E740481C1C}">
+                <a14:useLocalDpi xmlns:a14="http://schemas.microsoft.com/office/drawing/2010/main" val="0"/>
+              </a:ext>
+            </a:extLst>
+          </a:blip>
+          <a:stretch>
+            <a:fillRect/>
+          </a:stretch>
+        </p:blipFill>
+        <p:spPr>
+          <a:xfrm>
+            <a:off x="20469342" y="17965576"/>
+            <a:ext cx="9025538" cy="6051213"/>
+          </a:xfrm>
+          <a:prstGeom prst="rect">
+            <a:avLst/>
+          </a:prstGeom>
+        </p:spPr>
+      </p:pic>
+      <p:pic>
+        <p:nvPicPr>
+          <p:cNvPr id="4" name="Bild 3"/>
+          <p:cNvPicPr>
+            <a:picLocks noChangeAspect="1"/>
+          </p:cNvPicPr>
+          <p:nvPr/>
+        </p:nvPicPr>
+        <p:blipFill>
+          <a:blip r:embed="rId10">
+            <a:extLst>
+              <a:ext uri="{28A0092B-C50C-407E-A947-70E740481C1C}">
+                <a14:useLocalDpi xmlns:a14="http://schemas.microsoft.com/office/drawing/2010/main" val="0"/>
+              </a:ext>
+            </a:extLst>
+          </a:blip>
+          <a:stretch>
+            <a:fillRect/>
+          </a:stretch>
+        </p:blipFill>
+        <p:spPr>
+          <a:xfrm>
+            <a:off x="9592064" y="19644458"/>
+            <a:ext cx="5111699" cy="3427162"/>
+          </a:xfrm>
+          <a:prstGeom prst="rect">
+            <a:avLst/>
+          </a:prstGeom>
+        </p:spPr>
+      </p:pic>
+      <p:pic>
+        <p:nvPicPr>
+          <p:cNvPr id="7" name="Bild 6"/>
+          <p:cNvPicPr>
+            <a:picLocks noChangeAspect="1"/>
+          </p:cNvPicPr>
+          <p:nvPr/>
+        </p:nvPicPr>
+        <p:blipFill>
+          <a:blip r:embed="rId11">
+            <a:extLst>
+              <a:ext uri="{28A0092B-C50C-407E-A947-70E740481C1C}">
+                <a14:useLocalDpi xmlns:a14="http://schemas.microsoft.com/office/drawing/2010/main" val="0"/>
+              </a:ext>
+            </a:extLst>
+          </a:blip>
+          <a:stretch>
+            <a:fillRect/>
+          </a:stretch>
+        </p:blipFill>
+        <p:spPr>
+          <a:xfrm>
+            <a:off x="14960068" y="19644458"/>
+            <a:ext cx="5111699" cy="3427162"/>
+          </a:xfrm>
+          <a:prstGeom prst="rect">
+            <a:avLst/>
+          </a:prstGeom>
+        </p:spPr>
+      </p:pic>
+      <p:pic>
+        <p:nvPicPr>
+          <p:cNvPr id="18" name="Bild 17"/>
+          <p:cNvPicPr>
+            <a:picLocks noChangeAspect="1"/>
+          </p:cNvPicPr>
+          <p:nvPr/>
+        </p:nvPicPr>
+        <p:blipFill>
+          <a:blip r:embed="rId12">
+            <a:extLst>
+              <a:ext uri="{28A0092B-C50C-407E-A947-70E740481C1C}">
+                <a14:useLocalDpi xmlns:a14="http://schemas.microsoft.com/office/drawing/2010/main" val="0"/>
+              </a:ext>
+            </a:extLst>
+          </a:blip>
+          <a:stretch>
+            <a:fillRect/>
+          </a:stretch>
+        </p:blipFill>
+        <p:spPr>
+          <a:xfrm>
+            <a:off x="23573919" y="21321601"/>
+            <a:ext cx="1287795" cy="861782"/>
+          </a:xfrm>
+          <a:prstGeom prst="rect">
+            <a:avLst/>
+          </a:prstGeom>
+        </p:spPr>
+      </p:pic>
+      <p:pic>
+        <p:nvPicPr>
+          <p:cNvPr id="19" name="Bild 18"/>
+          <p:cNvPicPr>
+            <a:picLocks noChangeAspect="1"/>
+          </p:cNvPicPr>
+          <p:nvPr/>
+        </p:nvPicPr>
+        <p:blipFill>
+          <a:blip r:embed="rId13">
+            <a:extLst>
+              <a:ext uri="{28A0092B-C50C-407E-A947-70E740481C1C}">
+                <a14:useLocalDpi xmlns:a14="http://schemas.microsoft.com/office/drawing/2010/main" val="0"/>
+              </a:ext>
+            </a:extLst>
+          </a:blip>
+          <a:stretch>
+            <a:fillRect/>
+          </a:stretch>
+        </p:blipFill>
+        <p:spPr>
+          <a:xfrm>
+            <a:off x="23697780" y="18314449"/>
+            <a:ext cx="1103258" cy="738291"/>
+          </a:xfrm>
+          <a:prstGeom prst="rect">
+            <a:avLst/>
+          </a:prstGeom>
+        </p:spPr>
+      </p:pic>
+      <p:pic>
+        <p:nvPicPr>
+          <p:cNvPr id="20" name="Bild 19"/>
+          <p:cNvPicPr>
+            <a:picLocks noChangeAspect="1"/>
+          </p:cNvPicPr>
+          <p:nvPr/>
+        </p:nvPicPr>
+        <p:blipFill>
+          <a:blip r:embed="rId14">
+            <a:extLst>
+              <a:ext uri="{28A0092B-C50C-407E-A947-70E740481C1C}">
+                <a14:useLocalDpi xmlns:a14="http://schemas.microsoft.com/office/drawing/2010/main" val="0"/>
+              </a:ext>
+            </a:extLst>
+          </a:blip>
+          <a:stretch>
+            <a:fillRect/>
+          </a:stretch>
+        </p:blipFill>
+        <p:spPr>
+          <a:xfrm>
+            <a:off x="28242103" y="21321558"/>
+            <a:ext cx="1119850" cy="749395"/>
+          </a:xfrm>
+          <a:prstGeom prst="rect">
+            <a:avLst/>
+          </a:prstGeom>
+        </p:spPr>
+      </p:pic>
+      <p:pic>
+        <p:nvPicPr>
+          <p:cNvPr id="21" name="Bild 20"/>
+          <p:cNvPicPr>
+            <a:picLocks noChangeAspect="1"/>
+          </p:cNvPicPr>
+          <p:nvPr/>
+        </p:nvPicPr>
+        <p:blipFill>
+          <a:blip r:embed="rId15">
+            <a:extLst>
+              <a:ext uri="{28A0092B-C50C-407E-A947-70E740481C1C}">
+                <a14:useLocalDpi xmlns:a14="http://schemas.microsoft.com/office/drawing/2010/main" val="0"/>
+              </a:ext>
+            </a:extLst>
+          </a:blip>
+          <a:stretch>
+            <a:fillRect/>
+          </a:stretch>
+        </p:blipFill>
+        <p:spPr>
+          <a:xfrm>
+            <a:off x="28475551" y="18290978"/>
+            <a:ext cx="880700" cy="589357"/>
+          </a:xfrm>
+          <a:prstGeom prst="rect">
+            <a:avLst/>
+          </a:prstGeom>
+        </p:spPr>
+      </p:pic>
     </p:spTree>
     <p:extLst>
       <p:ext uri="{BB962C8B-B14F-4D97-AF65-F5344CB8AC3E}">

</xml_diff>